<commit_message>
Session 1: Incorporate IV feedback. Change survey package version. Add session info.
</commit_message>
<xml_diff>
--- a/Presentation/Slides-day-1.pptx
+++ b/Presentation/Slides-day-1.pptx
@@ -45,6 +45,11 @@
     <p:sldId id="293" r:id="rId43"/>
     <p:sldId id="294" r:id="rId44"/>
     <p:sldId id="295" r:id="rId45"/>
+    <p:sldId id="296" r:id="rId46"/>
+    <p:sldId id="297" r:id="rId47"/>
+    <p:sldId id="298" r:id="rId48"/>
+    <p:sldId id="299" r:id="rId49"/>
+    <p:sldId id="300" r:id="rId50"/>
   </p:sldIdLst>
   <p:sldSz cx="12192000" cy="6858000"/>
   <p:notesSz cx="6858000" cy="9144000"/>
@@ -5133,6 +5138,261 @@
 </p:sld>
 </file>
 
+<file path=ppt/slides/slide41.xml><?xml version="1.0" encoding="utf-8"?>
+<p:sld xmlns:a="http://schemas.openxmlformats.org/drawingml/2006/main" xmlns:r="http://schemas.openxmlformats.org/officeDocument/2006/relationships" xmlns:p="http://schemas.openxmlformats.org/presentationml/2006/main">
+  <p:cSld>
+    <p:spTree>
+      <p:nvGrpSpPr>
+        <p:cNvPr id="1" name=""/>
+        <p:cNvGrpSpPr/>
+        <p:nvPr/>
+      </p:nvGrpSpPr>
+      <p:grpSpPr>
+        <a:xfrm>
+          <a:off x="0" y="0"/>
+          <a:ext cx="0" cy="0"/>
+          <a:chOff x="0" y="0"/>
+          <a:chExt cx="0" cy="0"/>
+        </a:xfrm>
+      </p:grpSpPr>
+      <p:pic xmlns:a="http://schemas.openxmlformats.org/drawingml/2006/main" xmlns:r="http://schemas.openxmlformats.org/officeDocument/2006/relationships" xmlns:p="http://schemas.openxmlformats.org/presentationml/2006/main">
+        <p:nvPicPr>
+          <p:cNvPr id="2" name="" descr=""/>
+          <p:cNvPicPr>
+            <a:picLocks noGrp="1"/>
+          </p:cNvPicPr>
+          <p:nvPr>
+            <p:ph/>
+          </p:nvPr>
+        </p:nvPicPr>
+        <p:blipFill>
+          <a:blip cstate="print" r:embed="rId2"/>
+          <a:stretch>
+            <a:fillRect/>
+          </a:stretch>
+        </p:blipFill>
+        <p:spPr>
+          <a:xfrm>
+            <a:off x="0" y="0"/>
+            <a:ext cx="12192000" cy="6858000"/>
+          </a:xfrm>
+          <a:prstGeom prst="rect">
+            <a:avLst/>
+          </a:prstGeom>
+        </p:spPr>
+      </p:pic>
+    </p:spTree>
+  </p:cSld>
+  <p:clrMapOvr>
+    <a:masterClrMapping/>
+  </p:clrMapOvr>
+</p:sld>
+</file>
+
+<file path=ppt/slides/slide42.xml><?xml version="1.0" encoding="utf-8"?>
+<p:sld xmlns:a="http://schemas.openxmlformats.org/drawingml/2006/main" xmlns:r="http://schemas.openxmlformats.org/officeDocument/2006/relationships" xmlns:p="http://schemas.openxmlformats.org/presentationml/2006/main">
+  <p:cSld>
+    <p:spTree>
+      <p:nvGrpSpPr>
+        <p:cNvPr id="1" name=""/>
+        <p:cNvGrpSpPr/>
+        <p:nvPr/>
+      </p:nvGrpSpPr>
+      <p:grpSpPr>
+        <a:xfrm>
+          <a:off x="0" y="0"/>
+          <a:ext cx="0" cy="0"/>
+          <a:chOff x="0" y="0"/>
+          <a:chExt cx="0" cy="0"/>
+        </a:xfrm>
+      </p:grpSpPr>
+      <p:pic xmlns:a="http://schemas.openxmlformats.org/drawingml/2006/main" xmlns:r="http://schemas.openxmlformats.org/officeDocument/2006/relationships" xmlns:p="http://schemas.openxmlformats.org/presentationml/2006/main">
+        <p:nvPicPr>
+          <p:cNvPr id="2" name="" descr=""/>
+          <p:cNvPicPr>
+            <a:picLocks noGrp="1"/>
+          </p:cNvPicPr>
+          <p:nvPr>
+            <p:ph/>
+          </p:nvPr>
+        </p:nvPicPr>
+        <p:blipFill>
+          <a:blip cstate="print" r:embed="rId2"/>
+          <a:stretch>
+            <a:fillRect/>
+          </a:stretch>
+        </p:blipFill>
+        <p:spPr>
+          <a:xfrm>
+            <a:off x="0" y="0"/>
+            <a:ext cx="12192000" cy="6858000"/>
+          </a:xfrm>
+          <a:prstGeom prst="rect">
+            <a:avLst/>
+          </a:prstGeom>
+        </p:spPr>
+      </p:pic>
+    </p:spTree>
+  </p:cSld>
+  <p:clrMapOvr>
+    <a:masterClrMapping/>
+  </p:clrMapOvr>
+</p:sld>
+</file>
+
+<file path=ppt/slides/slide43.xml><?xml version="1.0" encoding="utf-8"?>
+<p:sld xmlns:a="http://schemas.openxmlformats.org/drawingml/2006/main" xmlns:r="http://schemas.openxmlformats.org/officeDocument/2006/relationships" xmlns:p="http://schemas.openxmlformats.org/presentationml/2006/main">
+  <p:cSld>
+    <p:spTree>
+      <p:nvGrpSpPr>
+        <p:cNvPr id="1" name=""/>
+        <p:cNvGrpSpPr/>
+        <p:nvPr/>
+      </p:nvGrpSpPr>
+      <p:grpSpPr>
+        <a:xfrm>
+          <a:off x="0" y="0"/>
+          <a:ext cx="0" cy="0"/>
+          <a:chOff x="0" y="0"/>
+          <a:chExt cx="0" cy="0"/>
+        </a:xfrm>
+      </p:grpSpPr>
+      <p:pic xmlns:a="http://schemas.openxmlformats.org/drawingml/2006/main" xmlns:r="http://schemas.openxmlformats.org/officeDocument/2006/relationships" xmlns:p="http://schemas.openxmlformats.org/presentationml/2006/main">
+        <p:nvPicPr>
+          <p:cNvPr id="2" name="" descr=""/>
+          <p:cNvPicPr>
+            <a:picLocks noGrp="1"/>
+          </p:cNvPicPr>
+          <p:nvPr>
+            <p:ph/>
+          </p:nvPr>
+        </p:nvPicPr>
+        <p:blipFill>
+          <a:blip cstate="print" r:embed="rId2"/>
+          <a:stretch>
+            <a:fillRect/>
+          </a:stretch>
+        </p:blipFill>
+        <p:spPr>
+          <a:xfrm>
+            <a:off x="0" y="0"/>
+            <a:ext cx="12192000" cy="6858000"/>
+          </a:xfrm>
+          <a:prstGeom prst="rect">
+            <a:avLst/>
+          </a:prstGeom>
+        </p:spPr>
+      </p:pic>
+    </p:spTree>
+  </p:cSld>
+  <p:clrMapOvr>
+    <a:masterClrMapping/>
+  </p:clrMapOvr>
+</p:sld>
+</file>
+
+<file path=ppt/slides/slide44.xml><?xml version="1.0" encoding="utf-8"?>
+<p:sld xmlns:a="http://schemas.openxmlformats.org/drawingml/2006/main" xmlns:r="http://schemas.openxmlformats.org/officeDocument/2006/relationships" xmlns:p="http://schemas.openxmlformats.org/presentationml/2006/main">
+  <p:cSld>
+    <p:spTree>
+      <p:nvGrpSpPr>
+        <p:cNvPr id="1" name=""/>
+        <p:cNvGrpSpPr/>
+        <p:nvPr/>
+      </p:nvGrpSpPr>
+      <p:grpSpPr>
+        <a:xfrm>
+          <a:off x="0" y="0"/>
+          <a:ext cx="0" cy="0"/>
+          <a:chOff x="0" y="0"/>
+          <a:chExt cx="0" cy="0"/>
+        </a:xfrm>
+      </p:grpSpPr>
+      <p:pic xmlns:a="http://schemas.openxmlformats.org/drawingml/2006/main" xmlns:r="http://schemas.openxmlformats.org/officeDocument/2006/relationships" xmlns:p="http://schemas.openxmlformats.org/presentationml/2006/main">
+        <p:nvPicPr>
+          <p:cNvPr id="2" name="" descr=""/>
+          <p:cNvPicPr>
+            <a:picLocks noGrp="1"/>
+          </p:cNvPicPr>
+          <p:nvPr>
+            <p:ph/>
+          </p:nvPr>
+        </p:nvPicPr>
+        <p:blipFill>
+          <a:blip cstate="print" r:embed="rId2"/>
+          <a:stretch>
+            <a:fillRect/>
+          </a:stretch>
+        </p:blipFill>
+        <p:spPr>
+          <a:xfrm>
+            <a:off x="0" y="0"/>
+            <a:ext cx="12192000" cy="6858000"/>
+          </a:xfrm>
+          <a:prstGeom prst="rect">
+            <a:avLst/>
+          </a:prstGeom>
+        </p:spPr>
+      </p:pic>
+    </p:spTree>
+  </p:cSld>
+  <p:clrMapOvr>
+    <a:masterClrMapping/>
+  </p:clrMapOvr>
+</p:sld>
+</file>
+
+<file path=ppt/slides/slide45.xml><?xml version="1.0" encoding="utf-8"?>
+<p:sld xmlns:a="http://schemas.openxmlformats.org/drawingml/2006/main" xmlns:r="http://schemas.openxmlformats.org/officeDocument/2006/relationships" xmlns:p="http://schemas.openxmlformats.org/presentationml/2006/main">
+  <p:cSld>
+    <p:spTree>
+      <p:nvGrpSpPr>
+        <p:cNvPr id="1" name=""/>
+        <p:cNvGrpSpPr/>
+        <p:nvPr/>
+      </p:nvGrpSpPr>
+      <p:grpSpPr>
+        <a:xfrm>
+          <a:off x="0" y="0"/>
+          <a:ext cx="0" cy="0"/>
+          <a:chOff x="0" y="0"/>
+          <a:chExt cx="0" cy="0"/>
+        </a:xfrm>
+      </p:grpSpPr>
+      <p:pic xmlns:a="http://schemas.openxmlformats.org/drawingml/2006/main" xmlns:r="http://schemas.openxmlformats.org/officeDocument/2006/relationships" xmlns:p="http://schemas.openxmlformats.org/presentationml/2006/main">
+        <p:nvPicPr>
+          <p:cNvPr id="2" name="" descr=""/>
+          <p:cNvPicPr>
+            <a:picLocks noGrp="1"/>
+          </p:cNvPicPr>
+          <p:nvPr>
+            <p:ph/>
+          </p:nvPr>
+        </p:nvPicPr>
+        <p:blipFill>
+          <a:blip cstate="print" r:embed="rId2"/>
+          <a:stretch>
+            <a:fillRect/>
+          </a:stretch>
+        </p:blipFill>
+        <p:spPr>
+          <a:xfrm>
+            <a:off x="0" y="0"/>
+            <a:ext cx="12192000" cy="6858000"/>
+          </a:xfrm>
+          <a:prstGeom prst="rect">
+            <a:avLst/>
+          </a:prstGeom>
+        </p:spPr>
+      </p:pic>
+    </p:spTree>
+  </p:cSld>
+  <p:clrMapOvr>
+    <a:masterClrMapping/>
+  </p:clrMapOvr>
+</p:sld>
+</file>
+
 <file path=ppt/slides/slide5.xml><?xml version="1.0" encoding="utf-8"?>
 <p:sld xmlns:a="http://schemas.openxmlformats.org/drawingml/2006/main" xmlns:r="http://schemas.openxmlformats.org/officeDocument/2006/relationships" xmlns:p="http://schemas.openxmlformats.org/presentationml/2006/main">
   <p:cSld>

</xml_diff>

<commit_message>
Save workshop 1 slides in other formats
</commit_message>
<xml_diff>
--- a/Presentation/Slides-day-1.pptx
+++ b/Presentation/Slides-day-1.pptx
@@ -50,6 +50,10 @@
     <p:sldId id="298" r:id="rId48"/>
     <p:sldId id="299" r:id="rId49"/>
     <p:sldId id="300" r:id="rId50"/>
+    <p:sldId id="301" r:id="rId51"/>
+    <p:sldId id="302" r:id="rId52"/>
+    <p:sldId id="303" r:id="rId53"/>
+    <p:sldId id="304" r:id="rId54"/>
   </p:sldIdLst>
   <p:sldSz cx="12192000" cy="6858000"/>
   <p:notesSz cx="6858000" cy="9144000"/>
@@ -5393,6 +5397,210 @@
 </p:sld>
 </file>
 
+<file path=ppt/slides/slide46.xml><?xml version="1.0" encoding="utf-8"?>
+<p:sld xmlns:a="http://schemas.openxmlformats.org/drawingml/2006/main" xmlns:r="http://schemas.openxmlformats.org/officeDocument/2006/relationships" xmlns:p="http://schemas.openxmlformats.org/presentationml/2006/main">
+  <p:cSld>
+    <p:spTree>
+      <p:nvGrpSpPr>
+        <p:cNvPr id="1" name=""/>
+        <p:cNvGrpSpPr/>
+        <p:nvPr/>
+      </p:nvGrpSpPr>
+      <p:grpSpPr>
+        <a:xfrm>
+          <a:off x="0" y="0"/>
+          <a:ext cx="0" cy="0"/>
+          <a:chOff x="0" y="0"/>
+          <a:chExt cx="0" cy="0"/>
+        </a:xfrm>
+      </p:grpSpPr>
+      <p:pic xmlns:a="http://schemas.openxmlformats.org/drawingml/2006/main" xmlns:r="http://schemas.openxmlformats.org/officeDocument/2006/relationships" xmlns:p="http://schemas.openxmlformats.org/presentationml/2006/main">
+        <p:nvPicPr>
+          <p:cNvPr id="2" name="" descr=""/>
+          <p:cNvPicPr>
+            <a:picLocks noGrp="1"/>
+          </p:cNvPicPr>
+          <p:nvPr>
+            <p:ph/>
+          </p:nvPr>
+        </p:nvPicPr>
+        <p:blipFill>
+          <a:blip cstate="print" r:embed="rId2"/>
+          <a:stretch>
+            <a:fillRect/>
+          </a:stretch>
+        </p:blipFill>
+        <p:spPr>
+          <a:xfrm>
+            <a:off x="0" y="0"/>
+            <a:ext cx="12192000" cy="6858000"/>
+          </a:xfrm>
+          <a:prstGeom prst="rect">
+            <a:avLst/>
+          </a:prstGeom>
+        </p:spPr>
+      </p:pic>
+    </p:spTree>
+  </p:cSld>
+  <p:clrMapOvr>
+    <a:masterClrMapping/>
+  </p:clrMapOvr>
+</p:sld>
+</file>
+
+<file path=ppt/slides/slide47.xml><?xml version="1.0" encoding="utf-8"?>
+<p:sld xmlns:a="http://schemas.openxmlformats.org/drawingml/2006/main" xmlns:r="http://schemas.openxmlformats.org/officeDocument/2006/relationships" xmlns:p="http://schemas.openxmlformats.org/presentationml/2006/main">
+  <p:cSld>
+    <p:spTree>
+      <p:nvGrpSpPr>
+        <p:cNvPr id="1" name=""/>
+        <p:cNvGrpSpPr/>
+        <p:nvPr/>
+      </p:nvGrpSpPr>
+      <p:grpSpPr>
+        <a:xfrm>
+          <a:off x="0" y="0"/>
+          <a:ext cx="0" cy="0"/>
+          <a:chOff x="0" y="0"/>
+          <a:chExt cx="0" cy="0"/>
+        </a:xfrm>
+      </p:grpSpPr>
+      <p:pic xmlns:a="http://schemas.openxmlformats.org/drawingml/2006/main" xmlns:r="http://schemas.openxmlformats.org/officeDocument/2006/relationships" xmlns:p="http://schemas.openxmlformats.org/presentationml/2006/main">
+        <p:nvPicPr>
+          <p:cNvPr id="2" name="" descr=""/>
+          <p:cNvPicPr>
+            <a:picLocks noGrp="1"/>
+          </p:cNvPicPr>
+          <p:nvPr>
+            <p:ph/>
+          </p:nvPr>
+        </p:nvPicPr>
+        <p:blipFill>
+          <a:blip cstate="print" r:embed="rId2"/>
+          <a:stretch>
+            <a:fillRect/>
+          </a:stretch>
+        </p:blipFill>
+        <p:spPr>
+          <a:xfrm>
+            <a:off x="0" y="0"/>
+            <a:ext cx="12192000" cy="6858000"/>
+          </a:xfrm>
+          <a:prstGeom prst="rect">
+            <a:avLst/>
+          </a:prstGeom>
+        </p:spPr>
+      </p:pic>
+    </p:spTree>
+  </p:cSld>
+  <p:clrMapOvr>
+    <a:masterClrMapping/>
+  </p:clrMapOvr>
+</p:sld>
+</file>
+
+<file path=ppt/slides/slide48.xml><?xml version="1.0" encoding="utf-8"?>
+<p:sld xmlns:a="http://schemas.openxmlformats.org/drawingml/2006/main" xmlns:r="http://schemas.openxmlformats.org/officeDocument/2006/relationships" xmlns:p="http://schemas.openxmlformats.org/presentationml/2006/main">
+  <p:cSld>
+    <p:spTree>
+      <p:nvGrpSpPr>
+        <p:cNvPr id="1" name=""/>
+        <p:cNvGrpSpPr/>
+        <p:nvPr/>
+      </p:nvGrpSpPr>
+      <p:grpSpPr>
+        <a:xfrm>
+          <a:off x="0" y="0"/>
+          <a:ext cx="0" cy="0"/>
+          <a:chOff x="0" y="0"/>
+          <a:chExt cx="0" cy="0"/>
+        </a:xfrm>
+      </p:grpSpPr>
+      <p:pic xmlns:a="http://schemas.openxmlformats.org/drawingml/2006/main" xmlns:r="http://schemas.openxmlformats.org/officeDocument/2006/relationships" xmlns:p="http://schemas.openxmlformats.org/presentationml/2006/main">
+        <p:nvPicPr>
+          <p:cNvPr id="2" name="" descr=""/>
+          <p:cNvPicPr>
+            <a:picLocks noGrp="1"/>
+          </p:cNvPicPr>
+          <p:nvPr>
+            <p:ph/>
+          </p:nvPr>
+        </p:nvPicPr>
+        <p:blipFill>
+          <a:blip cstate="print" r:embed="rId2"/>
+          <a:stretch>
+            <a:fillRect/>
+          </a:stretch>
+        </p:blipFill>
+        <p:spPr>
+          <a:xfrm>
+            <a:off x="0" y="0"/>
+            <a:ext cx="12192000" cy="6858000"/>
+          </a:xfrm>
+          <a:prstGeom prst="rect">
+            <a:avLst/>
+          </a:prstGeom>
+        </p:spPr>
+      </p:pic>
+    </p:spTree>
+  </p:cSld>
+  <p:clrMapOvr>
+    <a:masterClrMapping/>
+  </p:clrMapOvr>
+</p:sld>
+</file>
+
+<file path=ppt/slides/slide49.xml><?xml version="1.0" encoding="utf-8"?>
+<p:sld xmlns:a="http://schemas.openxmlformats.org/drawingml/2006/main" xmlns:r="http://schemas.openxmlformats.org/officeDocument/2006/relationships" xmlns:p="http://schemas.openxmlformats.org/presentationml/2006/main">
+  <p:cSld>
+    <p:spTree>
+      <p:nvGrpSpPr>
+        <p:cNvPr id="1" name=""/>
+        <p:cNvGrpSpPr/>
+        <p:nvPr/>
+      </p:nvGrpSpPr>
+      <p:grpSpPr>
+        <a:xfrm>
+          <a:off x="0" y="0"/>
+          <a:ext cx="0" cy="0"/>
+          <a:chOff x="0" y="0"/>
+          <a:chExt cx="0" cy="0"/>
+        </a:xfrm>
+      </p:grpSpPr>
+      <p:pic xmlns:a="http://schemas.openxmlformats.org/drawingml/2006/main" xmlns:r="http://schemas.openxmlformats.org/officeDocument/2006/relationships" xmlns:p="http://schemas.openxmlformats.org/presentationml/2006/main">
+        <p:nvPicPr>
+          <p:cNvPr id="2" name="" descr=""/>
+          <p:cNvPicPr>
+            <a:picLocks noGrp="1"/>
+          </p:cNvPicPr>
+          <p:nvPr>
+            <p:ph/>
+          </p:nvPr>
+        </p:nvPicPr>
+        <p:blipFill>
+          <a:blip cstate="print" r:embed="rId2"/>
+          <a:stretch>
+            <a:fillRect/>
+          </a:stretch>
+        </p:blipFill>
+        <p:spPr>
+          <a:xfrm>
+            <a:off x="0" y="0"/>
+            <a:ext cx="12192000" cy="6858000"/>
+          </a:xfrm>
+          <a:prstGeom prst="rect">
+            <a:avLst/>
+          </a:prstGeom>
+        </p:spPr>
+      </p:pic>
+    </p:spTree>
+  </p:cSld>
+  <p:clrMapOvr>
+    <a:masterClrMapping/>
+  </p:clrMapOvr>
+</p:sld>
+</file>
+
 <file path=ppt/slides/slide5.xml><?xml version="1.0" encoding="utf-8"?>
 <p:sld xmlns:a="http://schemas.openxmlformats.org/drawingml/2006/main" xmlns:r="http://schemas.openxmlformats.org/officeDocument/2006/relationships" xmlns:p="http://schemas.openxmlformats.org/presentationml/2006/main">
   <p:cSld>

</xml_diff>

<commit_message>
Update volunteers and social media refs
</commit_message>
<xml_diff>
--- a/Presentation/Slides-day-1.pptx
+++ b/Presentation/Slides-day-1.pptx
@@ -54,7 +54,6 @@
     <p:sldId id="302" r:id="rId52"/>
     <p:sldId id="303" r:id="rId53"/>
     <p:sldId id="304" r:id="rId54"/>
-    <p:sldId id="305" r:id="rId55"/>
   </p:sldIdLst>
   <p:sldSz cx="12192000" cy="6858000"/>
   <p:notesSz cx="6858000" cy="9144000"/>
@@ -5653,57 +5652,6 @@
 </p:sld>
 </file>
 
-<file path=ppt/slides/slide50.xml><?xml version="1.0" encoding="utf-8"?>
-<p:sld xmlns:a="http://schemas.openxmlformats.org/drawingml/2006/main" xmlns:r="http://schemas.openxmlformats.org/officeDocument/2006/relationships" xmlns:p="http://schemas.openxmlformats.org/presentationml/2006/main">
-  <p:cSld>
-    <p:spTree>
-      <p:nvGrpSpPr>
-        <p:cNvPr id="1" name=""/>
-        <p:cNvGrpSpPr/>
-        <p:nvPr/>
-      </p:nvGrpSpPr>
-      <p:grpSpPr>
-        <a:xfrm>
-          <a:off x="0" y="0"/>
-          <a:ext cx="0" cy="0"/>
-          <a:chOff x="0" y="0"/>
-          <a:chExt cx="0" cy="0"/>
-        </a:xfrm>
-      </p:grpSpPr>
-      <p:pic xmlns:a="http://schemas.openxmlformats.org/drawingml/2006/main" xmlns:r="http://schemas.openxmlformats.org/officeDocument/2006/relationships" xmlns:p="http://schemas.openxmlformats.org/presentationml/2006/main">
-        <p:nvPicPr>
-          <p:cNvPr id="2" name="" descr=""/>
-          <p:cNvPicPr>
-            <a:picLocks noGrp="1"/>
-          </p:cNvPicPr>
-          <p:nvPr>
-            <p:ph/>
-          </p:nvPr>
-        </p:nvPicPr>
-        <p:blipFill>
-          <a:blip cstate="print" r:embed="rId2"/>
-          <a:stretch>
-            <a:fillRect/>
-          </a:stretch>
-        </p:blipFill>
-        <p:spPr>
-          <a:xfrm>
-            <a:off x="0" y="0"/>
-            <a:ext cx="12192000" cy="6858000"/>
-          </a:xfrm>
-          <a:prstGeom prst="rect">
-            <a:avLst/>
-          </a:prstGeom>
-        </p:spPr>
-      </p:pic>
-    </p:spTree>
-  </p:cSld>
-  <p:clrMapOvr>
-    <a:masterClrMapping/>
-  </p:clrMapOvr>
-</p:sld>
-</file>
-
 <file path=ppt/slides/slide6.xml><?xml version="1.0" encoding="utf-8"?>
 <p:sld xmlns:a="http://schemas.openxmlformats.org/drawingml/2006/main" xmlns:r="http://schemas.openxmlformats.org/officeDocument/2006/relationships" xmlns:p="http://schemas.openxmlformats.org/presentationml/2006/main">
   <p:cSld>

</xml_diff>

<commit_message>
Image path change to relative from HTML files
</commit_message>
<xml_diff>
--- a/Presentation/Slides-day-1.pptx
+++ b/Presentation/Slides-day-1.pptx
@@ -54,6 +54,7 @@
     <p:sldId id="302" r:id="rId52"/>
     <p:sldId id="303" r:id="rId53"/>
     <p:sldId id="304" r:id="rId54"/>
+    <p:sldId id="305" r:id="rId55"/>
   </p:sldIdLst>
   <p:sldSz cx="12192000" cy="6858000"/>
   <p:notesSz cx="6858000" cy="9144000"/>
@@ -5652,6 +5653,57 @@
 </p:sld>
 </file>
 
+<file path=ppt/slides/slide50.xml><?xml version="1.0" encoding="utf-8"?>
+<p:sld xmlns:a="http://schemas.openxmlformats.org/drawingml/2006/main" xmlns:r="http://schemas.openxmlformats.org/officeDocument/2006/relationships" xmlns:p="http://schemas.openxmlformats.org/presentationml/2006/main">
+  <p:cSld>
+    <p:spTree>
+      <p:nvGrpSpPr>
+        <p:cNvPr id="1" name=""/>
+        <p:cNvGrpSpPr/>
+        <p:nvPr/>
+      </p:nvGrpSpPr>
+      <p:grpSpPr>
+        <a:xfrm>
+          <a:off x="0" y="0"/>
+          <a:ext cx="0" cy="0"/>
+          <a:chOff x="0" y="0"/>
+          <a:chExt cx="0" cy="0"/>
+        </a:xfrm>
+      </p:grpSpPr>
+      <p:pic xmlns:a="http://schemas.openxmlformats.org/drawingml/2006/main" xmlns:r="http://schemas.openxmlformats.org/officeDocument/2006/relationships" xmlns:p="http://schemas.openxmlformats.org/presentationml/2006/main">
+        <p:nvPicPr>
+          <p:cNvPr id="2" name="" descr=""/>
+          <p:cNvPicPr>
+            <a:picLocks noGrp="1"/>
+          </p:cNvPicPr>
+          <p:nvPr>
+            <p:ph/>
+          </p:nvPr>
+        </p:nvPicPr>
+        <p:blipFill>
+          <a:blip cstate="print" r:embed="rId2"/>
+          <a:stretch>
+            <a:fillRect/>
+          </a:stretch>
+        </p:blipFill>
+        <p:spPr>
+          <a:xfrm>
+            <a:off x="0" y="0"/>
+            <a:ext cx="12192000" cy="6858000"/>
+          </a:xfrm>
+          <a:prstGeom prst="rect">
+            <a:avLst/>
+          </a:prstGeom>
+        </p:spPr>
+      </p:pic>
+    </p:spTree>
+  </p:cSld>
+  <p:clrMapOvr>
+    <a:masterClrMapping/>
+  </p:clrMapOvr>
+</p:sld>
+</file>
+
 <file path=ppt/slides/slide6.xml><?xml version="1.0" encoding="utf-8"?>
 <p:sld xmlns:a="http://schemas.openxmlformats.org/drawingml/2006/main" xmlns:r="http://schemas.openxmlformats.org/officeDocument/2006/relationships" xmlns:p="http://schemas.openxmlformats.org/presentationml/2006/main">
   <p:cSld>

</xml_diff>